<commit_message>
Layout nachgezogen PER 05, SCR 06 und SCR 07
Only tomato cluster is without right layout
</commit_message>
<xml_diff>
--- a/agile moves/Scrum (SCR)/ger_SCR_08_Good_Team_BUT.pptx
+++ b/agile moves/Scrum (SCR)/ger_SCR_08_Good_Team_BUT.pptx
@@ -193,7 +193,7 @@
           <a:p>
             <a:fld id="{5CFD750B-D25D-E74F-B83B-866A1CA95656}" type="datetimeFigureOut">
               <a:rPr lang="de-DE" smtClean="0"/>
-              <a:t>28.05.15</a:t>
+              <a:t>29.05.15</a:t>
             </a:fld>
             <a:endParaRPr lang="de-DE"/>
           </a:p>
@@ -941,7 +941,7 @@
                 <a:latin typeface="Avenir Heavy"/>
                 <a:cs typeface="Avenir Heavy"/>
               </a:rPr>
-              <a:t>TR	AININGS</a:t>
+              <a:t>TRAININGS</a:t>
             </a:r>
             <a:r>
               <a:rPr lang="de-DE" sz="2400" dirty="0" smtClean="0">
@@ -1157,7 +1157,7 @@
           <a:p>
             <a:fld id="{FF5B2BAF-DF38-0A48-A798-0C06E514FD52}" type="datetimeFigureOut">
               <a:rPr lang="de-DE" smtClean="0"/>
-              <a:t>28.05.15</a:t>
+              <a:t>29.05.15</a:t>
             </a:fld>
             <a:endParaRPr lang="de-DE" dirty="0"/>
           </a:p>
@@ -1242,6 +1242,53 @@
       </p:grpSpPr>
       <p:sp>
         <p:nvSpPr>
+          <p:cNvPr id="12" name="Rechteck 11"/>
+          <p:cNvSpPr/>
+          <p:nvPr userDrawn="1"/>
+        </p:nvSpPr>
+        <p:spPr>
+          <a:xfrm>
+            <a:off x="0" y="0"/>
+            <a:ext cx="7562850" cy="5330825"/>
+          </a:xfrm>
+          <a:prstGeom prst="rect">
+            <a:avLst/>
+          </a:prstGeom>
+          <a:noFill/>
+          <a:ln>
+            <a:solidFill>
+              <a:schemeClr val="bg1">
+                <a:lumMod val="75000"/>
+              </a:schemeClr>
+            </a:solidFill>
+          </a:ln>
+          <a:effectLst/>
+        </p:spPr>
+        <p:style>
+          <a:lnRef idx="1">
+            <a:schemeClr val="accent1"/>
+          </a:lnRef>
+          <a:fillRef idx="3">
+            <a:schemeClr val="accent1"/>
+          </a:fillRef>
+          <a:effectRef idx="2">
+            <a:schemeClr val="accent1"/>
+          </a:effectRef>
+          <a:fontRef idx="minor">
+            <a:schemeClr val="lt1"/>
+          </a:fontRef>
+        </p:style>
+        <p:txBody>
+          <a:bodyPr rtlCol="0" anchor="ctr"/>
+          <a:lstStyle/>
+          <a:p>
+            <a:pPr algn="ctr"/>
+            <a:endParaRPr lang="de-DE"/>
+          </a:p>
+        </p:txBody>
+      </p:sp>
+      <p:sp>
+        <p:nvSpPr>
           <p:cNvPr id="2" name="Titelplatzhalter 1"/>
           <p:cNvSpPr>
             <a:spLocks noGrp="1"/>
@@ -1380,7 +1427,7 @@
           <a:p>
             <a:fld id="{FF5B2BAF-DF38-0A48-A798-0C06E514FD52}" type="datetimeFigureOut">
               <a:rPr lang="de-DE" smtClean="0"/>
-              <a:t>28.05.15</a:t>
+              <a:t>29.05.15</a:t>
             </a:fld>
             <a:endParaRPr lang="de-DE" dirty="0"/>
           </a:p>
@@ -1614,6 +1661,16 @@
               <a:t>SCR</a:t>
             </a:r>
             <a:r>
+              <a:rPr lang="de-DE" sz="1050" b="1" baseline="0" dirty="0" smtClean="0">
+                <a:solidFill>
+                  <a:schemeClr val="bg1"/>
+                </a:solidFill>
+                <a:latin typeface="Avenir Heavy"/>
+                <a:cs typeface="Avenir Heavy"/>
+              </a:rPr>
+              <a:t> </a:t>
+            </a:r>
+            <a:r>
               <a:rPr lang="de-DE" sz="1050" b="1" dirty="0" smtClean="0">
                 <a:solidFill>
                   <a:schemeClr val="bg1"/>
@@ -1621,7 +1678,7 @@
                 <a:latin typeface="Avenir Heavy"/>
                 <a:cs typeface="Avenir Heavy"/>
               </a:rPr>
-              <a:t>-08</a:t>
+              <a:t>08</a:t>
             </a:r>
             <a:endParaRPr lang="de-DE" sz="1050" b="1" dirty="0">
               <a:solidFill>

</xml_diff>

<commit_message>
SCR Cluster Layout nachgezogen
</commit_message>
<xml_diff>
--- a/agile moves/Scrum (SCR)/ger_SCR_08_Good_Team_BUT.pptx
+++ b/agile moves/Scrum (SCR)/ger_SCR_08_Good_Team_BUT.pptx
@@ -193,7 +193,7 @@
           <a:p>
             <a:fld id="{5CFD750B-D25D-E74F-B83B-866A1CA95656}" type="datetimeFigureOut">
               <a:rPr lang="de-DE" smtClean="0"/>
-              <a:t>29.05.15</a:t>
+              <a:t>30.05.15</a:t>
             </a:fld>
             <a:endParaRPr lang="de-DE"/>
           </a:p>
@@ -1157,7 +1157,7 @@
           <a:p>
             <a:fld id="{FF5B2BAF-DF38-0A48-A798-0C06E514FD52}" type="datetimeFigureOut">
               <a:rPr lang="de-DE" smtClean="0"/>
-              <a:t>29.05.15</a:t>
+              <a:t>30.05.15</a:t>
             </a:fld>
             <a:endParaRPr lang="de-DE" dirty="0"/>
           </a:p>
@@ -1427,7 +1427,7 @@
           <a:p>
             <a:fld id="{FF5B2BAF-DF38-0A48-A798-0C06E514FD52}" type="datetimeFigureOut">
               <a:rPr lang="de-DE" smtClean="0"/>
-              <a:t>29.05.15</a:t>
+              <a:t>30.05.15</a:t>
             </a:fld>
             <a:endParaRPr lang="de-DE" dirty="0"/>
           </a:p>
@@ -2303,7 +2303,7 @@
         <p:spPr/>
         <p:txBody>
           <a:bodyPr>
-            <a:normAutofit/>
+            <a:normAutofit lnSpcReduction="10000"/>
           </a:bodyPr>
           <a:lstStyle/>
           <a:p>
@@ -2457,7 +2457,37 @@
             </a:r>
             <a:r>
               <a:rPr lang="de-DE" dirty="0" smtClean="0"/>
-              <a:t>Zeit, um die geposteten Ideen zu besprechen und zu diskutieren, worauf die Idee zielt und über die Umsetzung zu entscheiden. </a:t>
+              <a:t>Zeit, um die </a:t>
+            </a:r>
+            <a:r>
+              <a:rPr lang="de-DE" dirty="0"/>
+              <a:t/>
+            </a:r>
+            <a:br>
+              <a:rPr lang="de-DE" dirty="0"/>
+            </a:br>
+            <a:r>
+              <a:rPr lang="de-DE" dirty="0" smtClean="0"/>
+              <a:t>geposteten </a:t>
+            </a:r>
+            <a:r>
+              <a:rPr lang="de-DE" dirty="0" smtClean="0"/>
+              <a:t>Ideen zu besprechen und zu diskutieren, worauf die </a:t>
+            </a:r>
+            <a:r>
+              <a:rPr lang="de-DE" dirty="0" smtClean="0"/>
+              <a:t>Idee</a:t>
+            </a:r>
+            <a:br>
+              <a:rPr lang="de-DE" dirty="0" smtClean="0"/>
+            </a:br>
+            <a:r>
+              <a:rPr lang="de-DE" dirty="0" smtClean="0"/>
+              <a:t>zielt </a:t>
+            </a:r>
+            <a:r>
+              <a:rPr lang="de-DE" dirty="0" smtClean="0"/>
+              <a:t>und über die Umsetzung zu entscheiden. </a:t>
             </a:r>
           </a:p>
           <a:p>
@@ -2522,6 +2552,36 @@
           </a:p>
         </p:txBody>
       </p:sp>
+      <p:pic>
+        <p:nvPicPr>
+          <p:cNvPr id="5" name="Bild 4" descr="apprentice.pdf"/>
+          <p:cNvPicPr>
+            <a:picLocks noChangeAspect="1"/>
+          </p:cNvPicPr>
+          <p:nvPr/>
+        </p:nvPicPr>
+        <p:blipFill>
+          <a:blip r:embed="rId2">
+            <a:extLst>
+              <a:ext uri="{28A0092B-C50C-407E-A947-70E740481C1C}">
+                <a14:useLocalDpi xmlns:a14="http://schemas.microsoft.com/office/drawing/2010/main" val="0"/>
+              </a:ext>
+            </a:extLst>
+          </a:blip>
+          <a:stretch>
+            <a:fillRect/>
+          </a:stretch>
+        </p:blipFill>
+        <p:spPr>
+          <a:xfrm>
+            <a:off x="5930583" y="3839980"/>
+            <a:ext cx="939800" cy="914400"/>
+          </a:xfrm>
+          <a:prstGeom prst="rect">
+            <a:avLst/>
+          </a:prstGeom>
+        </p:spPr>
+      </p:pic>
     </p:spTree>
     <p:extLst>
       <p:ext uri="{BB962C8B-B14F-4D97-AF65-F5344CB8AC3E}">

</xml_diff>